<commit_message>
Solution fixed, no print func yet
</commit_message>
<xml_diff>
--- a/Developer Authentications/Facebook and Instagram Screencast.pptx
+++ b/Developer Authentications/Facebook and Instagram Screencast.pptx
@@ -8,7 +8,8 @@
     <p:sldId id="256" r:id="rId2"/>
     <p:sldId id="257" r:id="rId3"/>
     <p:sldId id="258" r:id="rId4"/>
-    <p:sldId id="259" r:id="rId5"/>
+    <p:sldId id="261" r:id="rId5"/>
+    <p:sldId id="259" r:id="rId6"/>
   </p:sldIdLst>
   <p:sldSz cx="12192000" cy="6858000"/>
   <p:notesSz cx="6858000" cy="9144000"/>
@@ -107,6 +108,11 @@
       </a:defRPr>
     </a:lvl9pPr>
   </p:defaultTextStyle>
+  <p:extLst>
+    <p:ext uri="{EFAFB233-063F-42B5-8137-9DF3F51BA10A}">
+      <p15:sldGuideLst xmlns:p15="http://schemas.microsoft.com/office/powerpoint/2012/main"/>
+    </p:ext>
+  </p:extLst>
 </p:presentation>
 </file>
 
@@ -257,7 +263,7 @@
           <a:p>
             <a:fld id="{88D2E5BD-9FAB-4D49-971E-FC28CA1D969D}" type="datetimeFigureOut">
               <a:rPr lang="en-US" smtClean="0"/>
-              <a:t>4/29/19</a:t>
+              <a:t>5/1/19</a:t>
             </a:fld>
             <a:endParaRPr lang="en-US"/>
           </a:p>
@@ -455,7 +461,7 @@
           <a:p>
             <a:fld id="{88D2E5BD-9FAB-4D49-971E-FC28CA1D969D}" type="datetimeFigureOut">
               <a:rPr lang="en-US" smtClean="0"/>
-              <a:t>4/29/19</a:t>
+              <a:t>5/1/19</a:t>
             </a:fld>
             <a:endParaRPr lang="en-US"/>
           </a:p>
@@ -663,7 +669,7 @@
           <a:p>
             <a:fld id="{88D2E5BD-9FAB-4D49-971E-FC28CA1D969D}" type="datetimeFigureOut">
               <a:rPr lang="en-US" smtClean="0"/>
-              <a:t>4/29/19</a:t>
+              <a:t>5/1/19</a:t>
             </a:fld>
             <a:endParaRPr lang="en-US"/>
           </a:p>
@@ -861,7 +867,7 @@
           <a:p>
             <a:fld id="{88D2E5BD-9FAB-4D49-971E-FC28CA1D969D}" type="datetimeFigureOut">
               <a:rPr lang="en-US" smtClean="0"/>
-              <a:t>4/29/19</a:t>
+              <a:t>5/1/19</a:t>
             </a:fld>
             <a:endParaRPr lang="en-US"/>
           </a:p>
@@ -1136,7 +1142,7 @@
           <a:p>
             <a:fld id="{88D2E5BD-9FAB-4D49-971E-FC28CA1D969D}" type="datetimeFigureOut">
               <a:rPr lang="en-US" smtClean="0"/>
-              <a:t>4/29/19</a:t>
+              <a:t>5/1/19</a:t>
             </a:fld>
             <a:endParaRPr lang="en-US"/>
           </a:p>
@@ -1401,7 +1407,7 @@
           <a:p>
             <a:fld id="{88D2E5BD-9FAB-4D49-971E-FC28CA1D969D}" type="datetimeFigureOut">
               <a:rPr lang="en-US" smtClean="0"/>
-              <a:t>4/29/19</a:t>
+              <a:t>5/1/19</a:t>
             </a:fld>
             <a:endParaRPr lang="en-US"/>
           </a:p>
@@ -1813,7 +1819,7 @@
           <a:p>
             <a:fld id="{88D2E5BD-9FAB-4D49-971E-FC28CA1D969D}" type="datetimeFigureOut">
               <a:rPr lang="en-US" smtClean="0"/>
-              <a:t>4/29/19</a:t>
+              <a:t>5/1/19</a:t>
             </a:fld>
             <a:endParaRPr lang="en-US"/>
           </a:p>
@@ -1954,7 +1960,7 @@
           <a:p>
             <a:fld id="{88D2E5BD-9FAB-4D49-971E-FC28CA1D969D}" type="datetimeFigureOut">
               <a:rPr lang="en-US" smtClean="0"/>
-              <a:t>4/29/19</a:t>
+              <a:t>5/1/19</a:t>
             </a:fld>
             <a:endParaRPr lang="en-US"/>
           </a:p>
@@ -2067,7 +2073,7 @@
           <a:p>
             <a:fld id="{88D2E5BD-9FAB-4D49-971E-FC28CA1D969D}" type="datetimeFigureOut">
               <a:rPr lang="en-US" smtClean="0"/>
-              <a:t>4/29/19</a:t>
+              <a:t>5/1/19</a:t>
             </a:fld>
             <a:endParaRPr lang="en-US"/>
           </a:p>
@@ -2378,7 +2384,7 @@
           <a:p>
             <a:fld id="{88D2E5BD-9FAB-4D49-971E-FC28CA1D969D}" type="datetimeFigureOut">
               <a:rPr lang="en-US" smtClean="0"/>
-              <a:t>4/29/19</a:t>
+              <a:t>5/1/19</a:t>
             </a:fld>
             <a:endParaRPr lang="en-US"/>
           </a:p>
@@ -2666,7 +2672,7 @@
           <a:p>
             <a:fld id="{88D2E5BD-9FAB-4D49-971E-FC28CA1D969D}" type="datetimeFigureOut">
               <a:rPr lang="en-US" smtClean="0"/>
-              <a:t>4/29/19</a:t>
+              <a:t>5/1/19</a:t>
             </a:fld>
             <a:endParaRPr lang="en-US"/>
           </a:p>
@@ -2907,7 +2913,7 @@
           <a:p>
             <a:fld id="{88D2E5BD-9FAB-4D49-971E-FC28CA1D969D}" type="datetimeFigureOut">
               <a:rPr lang="en-US" smtClean="0"/>
-              <a:t>4/29/19</a:t>
+              <a:t>5/1/19</a:t>
             </a:fld>
             <a:endParaRPr lang="en-US"/>
           </a:p>
@@ -3495,7 +3501,7 @@
           <a:lstStyle/>
           <a:p>
             <a:r>
-              <a:rPr lang="en-US" sz="5800"/>
+              <a:rPr lang="en-US" sz="5800" dirty="0"/>
               <a:t>Social Media API Project</a:t>
             </a:r>
           </a:p>
@@ -3530,12 +3536,12 @@
           <a:lstStyle/>
           <a:p>
             <a:r>
-              <a:rPr lang="en-US">
+              <a:rPr lang="en-US" dirty="0">
                 <a:solidFill>
                   <a:schemeClr val="accent1"/>
                 </a:solidFill>
               </a:rPr>
-              <a:t>How I will use</a:t>
+              <a:t>Facebook Graph API</a:t>
             </a:r>
           </a:p>
         </p:txBody>
@@ -4172,6 +4178,14 @@
 <file path=ppt/slides/slide4.xml><?xml version="1.0" encoding="utf-8"?>
 <p:sld xmlns:a="http://schemas.openxmlformats.org/drawingml/2006/main" xmlns:r="http://schemas.openxmlformats.org/officeDocument/2006/relationships" xmlns:p="http://schemas.openxmlformats.org/presentationml/2006/main">
   <p:cSld>
+    <p:bg>
+      <p:bgPr>
+        <a:solidFill>
+          <a:schemeClr val="bg1"/>
+        </a:solidFill>
+        <a:effectLst/>
+      </p:bgPr>
+    </p:bg>
     <p:spTree>
       <p:nvGrpSpPr>
         <p:cNvPr id="1" name=""/>
@@ -4186,11 +4200,448 @@
           <a:chExt cx="0" cy="0"/>
         </a:xfrm>
       </p:grpSpPr>
+      <p:pic>
+        <p:nvPicPr>
+          <p:cNvPr id="4" name="Picture 3">
+            <a:extLst>
+              <a:ext uri="{FF2B5EF4-FFF2-40B4-BE49-F238E27FC236}">
+                <a16:creationId xmlns:a16="http://schemas.microsoft.com/office/drawing/2014/main" id="{1AC13607-5F99-0B4A-BBD1-8AB7CF30D359}"/>
+              </a:ext>
+            </a:extLst>
+          </p:cNvPr>
+          <p:cNvPicPr>
+            <a:picLocks noChangeAspect="1"/>
+          </p:cNvPicPr>
+          <p:nvPr/>
+        </p:nvPicPr>
+        <p:blipFill>
+          <a:blip r:embed="rId2"/>
+          <a:stretch>
+            <a:fillRect/>
+          </a:stretch>
+        </p:blipFill>
+        <p:spPr>
+          <a:xfrm>
+            <a:off x="667186" y="643467"/>
+            <a:ext cx="6891187" cy="1826165"/>
+          </a:xfrm>
+          <a:prstGeom prst="rect">
+            <a:avLst/>
+          </a:prstGeom>
+        </p:spPr>
+      </p:pic>
+      <p:sp>
+        <p:nvSpPr>
+          <p:cNvPr id="18" name="Rectangle 13">
+            <a:extLst>
+              <a:ext uri="{FF2B5EF4-FFF2-40B4-BE49-F238E27FC236}">
+                <a16:creationId xmlns:a16="http://schemas.microsoft.com/office/drawing/2014/main" id="{F5493CFF-E43B-4B10-ACE1-C8A1246629EA}"/>
+              </a:ext>
+              <a:ext uri="{C183D7F6-B498-43B3-948B-1728B52AA6E4}">
+                <adec:decorative xmlns:adec="http://schemas.microsoft.com/office/drawing/2017/decorative" val="1"/>
+              </a:ext>
+            </a:extLst>
+          </p:cNvPr>
+          <p:cNvSpPr>
+            <a:spLocks noGrp="1" noRot="1" noChangeAspect="1" noMove="1" noResize="1" noEditPoints="1" noAdjustHandles="1" noChangeArrowheads="1" noChangeShapeType="1" noTextEdit="1"/>
+          </p:cNvSpPr>
+          <p:nvPr>
+            <p:extLst>
+              <p:ext uri="{386F3935-93C4-4BCD-93E2-E3B085C9AB24}">
+                <p16:designElem xmlns:p16="http://schemas.microsoft.com/office/powerpoint/2015/main" val="1"/>
+              </p:ext>
+            </p:extLst>
+          </p:nvPr>
+        </p:nvSpPr>
+        <p:spPr>
+          <a:xfrm>
+            <a:off x="8129873" y="0"/>
+            <a:ext cx="4062127" cy="6858000"/>
+          </a:xfrm>
+          <a:prstGeom prst="rect">
+            <a:avLst/>
+          </a:prstGeom>
+          <a:solidFill>
+            <a:schemeClr val="tx1">
+              <a:lumMod val="75000"/>
+              <a:lumOff val="25000"/>
+            </a:schemeClr>
+          </a:solidFill>
+          <a:ln>
+            <a:noFill/>
+          </a:ln>
+        </p:spPr>
+        <p:style>
+          <a:lnRef idx="2">
+            <a:schemeClr val="accent1">
+              <a:shade val="50000"/>
+            </a:schemeClr>
+          </a:lnRef>
+          <a:fillRef idx="1">
+            <a:schemeClr val="accent1"/>
+          </a:fillRef>
+          <a:effectRef idx="0">
+            <a:schemeClr val="accent1"/>
+          </a:effectRef>
+          <a:fontRef idx="minor">
+            <a:schemeClr val="lt1"/>
+          </a:fontRef>
+        </p:style>
+        <p:txBody>
+          <a:bodyPr rtlCol="0" anchor="ctr"/>
+          <a:lstStyle/>
+          <a:p>
+            <a:pPr marL="0" marR="0" lvl="0" indent="0" algn="ctr" defTabSz="914400" rtl="0" eaLnBrk="1" fontAlgn="auto" latinLnBrk="0" hangingPunct="1">
+              <a:lnSpc>
+                <a:spcPct val="100000"/>
+              </a:lnSpc>
+              <a:spcBef>
+                <a:spcPts val="0"/>
+              </a:spcBef>
+              <a:spcAft>
+                <a:spcPts val="0"/>
+              </a:spcAft>
+              <a:buClrTx/>
+              <a:buSzTx/>
+              <a:buFontTx/>
+              <a:buNone/>
+              <a:tabLst/>
+              <a:defRPr/>
+            </a:pPr>
+            <a:endParaRPr kumimoji="0" lang="en-US" sz="1800" b="0" i="0" u="none" strike="noStrike" kern="1200" cap="none" spc="0" normalizeH="0" baseline="0" noProof="0">
+              <a:ln>
+                <a:noFill/>
+              </a:ln>
+              <a:solidFill>
+                <a:prstClr val="white"/>
+              </a:solidFill>
+              <a:effectLst/>
+              <a:uLnTx/>
+              <a:uFillTx/>
+              <a:latin typeface="Calibri" panose="020F0502020204030204"/>
+              <a:ea typeface="+mn-ea"/>
+              <a:cs typeface="+mn-cs"/>
+            </a:endParaRPr>
+          </a:p>
+        </p:txBody>
+      </p:sp>
       <p:sp>
         <p:nvSpPr>
           <p:cNvPr id="2" name="Title 1">
             <a:extLst>
               <a:ext uri="{FF2B5EF4-FFF2-40B4-BE49-F238E27FC236}">
+                <a16:creationId xmlns:a16="http://schemas.microsoft.com/office/drawing/2014/main" id="{4AA6C885-BD2E-4246-A460-4C99218066EB}"/>
+              </a:ext>
+            </a:extLst>
+          </p:cNvPr>
+          <p:cNvSpPr>
+            <a:spLocks noGrp="1"/>
+          </p:cNvSpPr>
+          <p:nvPr>
+            <p:ph type="title"/>
+          </p:nvPr>
+        </p:nvSpPr>
+        <p:spPr>
+          <a:xfrm>
+            <a:off x="8502650" y="643467"/>
+            <a:ext cx="3117850" cy="2556385"/>
+          </a:xfrm>
+          <a:prstGeom prst="ellipse">
+            <a:avLst/>
+          </a:prstGeom>
+        </p:spPr>
+        <p:txBody>
+          <a:bodyPr anchor="b">
+            <a:normAutofit/>
+          </a:bodyPr>
+          <a:lstStyle/>
+          <a:p>
+            <a:r>
+              <a:rPr lang="en-US" sz="4800">
+                <a:solidFill>
+                  <a:schemeClr val="bg1"/>
+                </a:solidFill>
+              </a:rPr>
+              <a:t>Process</a:t>
+            </a:r>
+          </a:p>
+        </p:txBody>
+      </p:sp>
+      <p:sp>
+        <p:nvSpPr>
+          <p:cNvPr id="3" name="Content Placeholder 2">
+            <a:extLst>
+              <a:ext uri="{FF2B5EF4-FFF2-40B4-BE49-F238E27FC236}">
+                <a16:creationId xmlns:a16="http://schemas.microsoft.com/office/drawing/2014/main" id="{580F106E-E49D-5549-8FC3-A01435E1ABEB}"/>
+              </a:ext>
+            </a:extLst>
+          </p:cNvPr>
+          <p:cNvSpPr>
+            <a:spLocks noGrp="1"/>
+          </p:cNvSpPr>
+          <p:nvPr>
+            <p:ph idx="1"/>
+          </p:nvPr>
+        </p:nvSpPr>
+        <p:spPr>
+          <a:xfrm>
+            <a:off x="8502649" y="3358608"/>
+            <a:ext cx="3045883" cy="2831273"/>
+          </a:xfrm>
+        </p:spPr>
+        <p:txBody>
+          <a:bodyPr>
+            <a:normAutofit/>
+          </a:bodyPr>
+          <a:lstStyle/>
+          <a:p>
+            <a:pPr marL="0" indent="0">
+              <a:buNone/>
+            </a:pPr>
+            <a:r>
+              <a:rPr lang="en-US" sz="1800" dirty="0">
+                <a:solidFill>
+                  <a:schemeClr val="bg1"/>
+                </a:solidFill>
+              </a:rPr>
+              <a:t>Using the Facebook SDK for Python:</a:t>
+            </a:r>
+          </a:p>
+          <a:p>
+            <a:r>
+              <a:rPr lang="en-US" sz="1800" dirty="0">
+                <a:solidFill>
+                  <a:schemeClr val="bg1"/>
+                </a:solidFill>
+              </a:rPr>
+              <a:t>Output to have a number associated with the page</a:t>
+            </a:r>
+          </a:p>
+          <a:p>
+            <a:r>
+              <a:rPr lang="en-US" sz="1800" dirty="0">
+                <a:solidFill>
+                  <a:schemeClr val="bg1"/>
+                </a:solidFill>
+              </a:rPr>
+              <a:t>And a number showing the follower count on the page</a:t>
+            </a:r>
+          </a:p>
+          <a:p>
+            <a:endParaRPr lang="en-US" sz="1800" dirty="0">
+              <a:solidFill>
+                <a:schemeClr val="bg1"/>
+              </a:solidFill>
+            </a:endParaRPr>
+          </a:p>
+        </p:txBody>
+      </p:sp>
+      <p:cxnSp>
+        <p:nvCxnSpPr>
+          <p:cNvPr id="6" name="Straight Arrow Connector 5">
+            <a:extLst>
+              <a:ext uri="{FF2B5EF4-FFF2-40B4-BE49-F238E27FC236}">
+                <a16:creationId xmlns:a16="http://schemas.microsoft.com/office/drawing/2014/main" id="{4E7D5C72-EA57-C44A-A354-509F8274C59C}"/>
+              </a:ext>
+            </a:extLst>
+          </p:cNvPr>
+          <p:cNvCxnSpPr>
+            <a:stCxn id="4" idx="2"/>
+          </p:cNvCxnSpPr>
+          <p:nvPr/>
+        </p:nvCxnSpPr>
+        <p:spPr>
+          <a:xfrm flipH="1">
+            <a:off x="4112779" y="2469632"/>
+            <a:ext cx="1" cy="1521797"/>
+          </a:xfrm>
+          <a:prstGeom prst="straightConnector1">
+            <a:avLst/>
+          </a:prstGeom>
+          <a:ln>
+            <a:tailEnd type="triangle"/>
+          </a:ln>
+        </p:spPr>
+        <p:style>
+          <a:lnRef idx="1">
+            <a:schemeClr val="accent1"/>
+          </a:lnRef>
+          <a:fillRef idx="0">
+            <a:schemeClr val="accent1"/>
+          </a:fillRef>
+          <a:effectRef idx="0">
+            <a:schemeClr val="accent1"/>
+          </a:effectRef>
+          <a:fontRef idx="minor">
+            <a:schemeClr val="tx1"/>
+          </a:fontRef>
+        </p:style>
+      </p:cxnSp>
+      <p:pic>
+        <p:nvPicPr>
+          <p:cNvPr id="8" name="Picture 7" descr="A close up of text on a white background&#10;&#10;Description automatically generated">
+            <a:extLst>
+              <a:ext uri="{FF2B5EF4-FFF2-40B4-BE49-F238E27FC236}">
+                <a16:creationId xmlns:a16="http://schemas.microsoft.com/office/drawing/2014/main" id="{FA31DDE9-269A-AB43-9D6E-E00544166A6E}"/>
+              </a:ext>
+            </a:extLst>
+          </p:cNvPr>
+          <p:cNvPicPr>
+            <a:picLocks noChangeAspect="1"/>
+          </p:cNvPicPr>
+          <p:nvPr/>
+        </p:nvPicPr>
+        <p:blipFill>
+          <a:blip r:embed="rId3"/>
+          <a:stretch>
+            <a:fillRect/>
+          </a:stretch>
+        </p:blipFill>
+        <p:spPr>
+          <a:xfrm>
+            <a:off x="1128279" y="3991429"/>
+            <a:ext cx="5969000" cy="2527300"/>
+          </a:xfrm>
+          <a:prstGeom prst="rect">
+            <a:avLst/>
+          </a:prstGeom>
+        </p:spPr>
+      </p:pic>
+    </p:spTree>
+    <p:extLst>
+      <p:ext uri="{BB962C8B-B14F-4D97-AF65-F5344CB8AC3E}">
+        <p14:creationId xmlns:p14="http://schemas.microsoft.com/office/powerpoint/2010/main" val="3006889547"/>
+      </p:ext>
+    </p:extLst>
+  </p:cSld>
+  <p:clrMapOvr>
+    <a:masterClrMapping/>
+  </p:clrMapOvr>
+</p:sld>
+</file>
+
+<file path=ppt/slides/slide5.xml><?xml version="1.0" encoding="utf-8"?>
+<p:sld xmlns:a="http://schemas.openxmlformats.org/drawingml/2006/main" xmlns:r="http://schemas.openxmlformats.org/officeDocument/2006/relationships" xmlns:p="http://schemas.openxmlformats.org/presentationml/2006/main">
+  <p:cSld>
+    <p:bg>
+      <p:bgPr>
+        <a:solidFill>
+          <a:schemeClr val="bg1"/>
+        </a:solidFill>
+        <a:effectLst/>
+      </p:bgPr>
+    </p:bg>
+    <p:spTree>
+      <p:nvGrpSpPr>
+        <p:cNvPr id="1" name=""/>
+        <p:cNvGrpSpPr/>
+        <p:nvPr/>
+      </p:nvGrpSpPr>
+      <p:grpSpPr>
+        <a:xfrm>
+          <a:off x="0" y="0"/>
+          <a:ext cx="0" cy="0"/>
+          <a:chOff x="0" y="0"/>
+          <a:chExt cx="0" cy="0"/>
+        </a:xfrm>
+      </p:grpSpPr>
+      <p:sp>
+        <p:nvSpPr>
+          <p:cNvPr id="9" name="Rectangle 8">
+            <a:extLst>
+              <a:ext uri="{FF2B5EF4-FFF2-40B4-BE49-F238E27FC236}">
+                <a16:creationId xmlns:a16="http://schemas.microsoft.com/office/drawing/2014/main" id="{42A5316D-ED2F-4F89-B4B4-8D9240B1A348}"/>
+              </a:ext>
+              <a:ext uri="{C183D7F6-B498-43B3-948B-1728B52AA6E4}">
+                <adec:decorative xmlns:adec="http://schemas.microsoft.com/office/drawing/2017/decorative" val="1"/>
+              </a:ext>
+            </a:extLst>
+          </p:cNvPr>
+          <p:cNvSpPr>
+            <a:spLocks noGrp="1" noRot="1" noChangeAspect="1" noMove="1" noResize="1" noEditPoints="1" noAdjustHandles="1" noChangeArrowheads="1" noChangeShapeType="1" noTextEdit="1"/>
+          </p:cNvSpPr>
+          <p:nvPr>
+            <p:extLst>
+              <p:ext uri="{386F3935-93C4-4BCD-93E2-E3B085C9AB24}">
+                <p16:designElem xmlns:p16="http://schemas.microsoft.com/office/powerpoint/2015/main" val="1"/>
+              </p:ext>
+            </p:extLst>
+          </p:nvPr>
+        </p:nvSpPr>
+        <p:spPr>
+          <a:xfrm>
+            <a:off x="0" y="0"/>
+            <a:ext cx="2013557" cy="6858000"/>
+          </a:xfrm>
+          <a:prstGeom prst="rect">
+            <a:avLst/>
+          </a:prstGeom>
+          <a:solidFill>
+            <a:srgbClr val="7F7F7F"/>
+          </a:solidFill>
+          <a:ln>
+            <a:noFill/>
+          </a:ln>
+        </p:spPr>
+        <p:style>
+          <a:lnRef idx="2">
+            <a:schemeClr val="accent1">
+              <a:shade val="50000"/>
+            </a:schemeClr>
+          </a:lnRef>
+          <a:fillRef idx="1">
+            <a:schemeClr val="accent1"/>
+          </a:fillRef>
+          <a:effectRef idx="0">
+            <a:schemeClr val="accent1"/>
+          </a:effectRef>
+          <a:fontRef idx="minor">
+            <a:schemeClr val="lt1"/>
+          </a:fontRef>
+        </p:style>
+        <p:txBody>
+          <a:bodyPr rtlCol="0" anchor="ctr"/>
+          <a:lstStyle/>
+          <a:p>
+            <a:pPr marL="0" marR="0" lvl="0" indent="0" algn="ctr" defTabSz="914400" rtl="0" eaLnBrk="1" fontAlgn="auto" latinLnBrk="0" hangingPunct="1">
+              <a:lnSpc>
+                <a:spcPct val="100000"/>
+              </a:lnSpc>
+              <a:spcBef>
+                <a:spcPts val="0"/>
+              </a:spcBef>
+              <a:spcAft>
+                <a:spcPts val="0"/>
+              </a:spcAft>
+              <a:buClrTx/>
+              <a:buSzTx/>
+              <a:buFontTx/>
+              <a:buNone/>
+              <a:tabLst/>
+              <a:defRPr/>
+            </a:pPr>
+            <a:endParaRPr kumimoji="0" lang="en-US" sz="1800" b="0" i="0" u="none" strike="noStrike" kern="1200" cap="none" spc="0" normalizeH="0" baseline="0" noProof="0">
+              <a:ln>
+                <a:noFill/>
+              </a:ln>
+              <a:solidFill>
+                <a:prstClr val="white"/>
+              </a:solidFill>
+              <a:effectLst/>
+              <a:uLnTx/>
+              <a:uFillTx/>
+              <a:latin typeface="Calibri" panose="020F0502020204030204"/>
+              <a:ea typeface="+mn-ea"/>
+              <a:cs typeface="+mn-cs"/>
+            </a:endParaRPr>
+          </a:p>
+        </p:txBody>
+      </p:sp>
+      <p:sp>
+        <p:nvSpPr>
+          <p:cNvPr id="2" name="Title 1">
+            <a:extLst>
+              <a:ext uri="{FF2B5EF4-FFF2-40B4-BE49-F238E27FC236}">
                 <a16:creationId xmlns:a16="http://schemas.microsoft.com/office/drawing/2014/main" id="{16C55C10-90F6-7945-B334-9AE7CC9BF08A}"/>
               </a:ext>
             </a:extLst>
@@ -4202,18 +4653,71 @@
             <p:ph type="title"/>
           </p:nvPr>
         </p:nvSpPr>
-        <p:spPr/>
-        <p:txBody>
-          <a:bodyPr/>
-          <a:lstStyle/>
-          <a:p>
-            <a:r>
-              <a:rPr lang="en-US" dirty="0"/>
+        <p:spPr>
+          <a:xfrm>
+            <a:off x="694510" y="1487272"/>
+            <a:ext cx="2743200" cy="2743200"/>
+          </a:xfrm>
+          <a:prstGeom prst="ellipse">
+            <a:avLst/>
+          </a:prstGeom>
+          <a:solidFill>
+            <a:srgbClr val="262626"/>
+          </a:solidFill>
+          <a:ln w="174625" cmpd="thinThick">
+            <a:solidFill>
+              <a:srgbClr val="262626"/>
+            </a:solidFill>
+          </a:ln>
+        </p:spPr>
+        <p:txBody>
+          <a:bodyPr>
+            <a:normAutofit/>
+          </a:bodyPr>
+          <a:lstStyle/>
+          <a:p>
+            <a:pPr algn="ctr"/>
+            <a:r>
+              <a:rPr lang="en-US" sz="2600">
+                <a:solidFill>
+                  <a:srgbClr val="FFFFFF"/>
+                </a:solidFill>
+              </a:rPr>
               <a:t>Current Limitations</a:t>
             </a:r>
           </a:p>
         </p:txBody>
       </p:sp>
+      <p:pic>
+        <p:nvPicPr>
+          <p:cNvPr id="4" name="Picture 3">
+            <a:extLst>
+              <a:ext uri="{FF2B5EF4-FFF2-40B4-BE49-F238E27FC236}">
+                <a16:creationId xmlns:a16="http://schemas.microsoft.com/office/drawing/2014/main" id="{C6EE7014-8C54-0F47-9283-81AD5E7AB144}"/>
+              </a:ext>
+            </a:extLst>
+          </p:cNvPr>
+          <p:cNvPicPr>
+            <a:picLocks noChangeAspect="1"/>
+          </p:cNvPicPr>
+          <p:nvPr/>
+        </p:nvPicPr>
+        <p:blipFill>
+          <a:blip r:embed="rId2"/>
+          <a:stretch>
+            <a:fillRect/>
+          </a:stretch>
+        </p:blipFill>
+        <p:spPr>
+          <a:xfrm>
+            <a:off x="3970625" y="2615233"/>
+            <a:ext cx="7837718" cy="568233"/>
+          </a:xfrm>
+          <a:prstGeom prst="rect">
+            <a:avLst/>
+          </a:prstGeom>
+        </p:spPr>
+      </p:pic>
       <p:sp>
         <p:nvSpPr>
           <p:cNvPr id="3" name="Content Placeholder 2">
@@ -4230,18 +4734,34 @@
             <p:ph idx="1"/>
           </p:nvPr>
         </p:nvSpPr>
-        <p:spPr/>
-        <p:txBody>
-          <a:bodyPr/>
-          <a:lstStyle/>
-          <a:p>
-            <a:r>
-              <a:rPr lang="en-US" dirty="0"/>
+        <p:spPr>
+          <a:xfrm>
+            <a:off x="4038600" y="4426857"/>
+            <a:ext cx="7188199" cy="1750106"/>
+          </a:xfrm>
+        </p:spPr>
+        <p:txBody>
+          <a:bodyPr>
+            <a:normAutofit/>
+          </a:bodyPr>
+          <a:lstStyle/>
+          <a:p>
+            <a:r>
+              <a:rPr lang="en-US" sz="1800" dirty="0"/>
               <a:t>The need for public content page access to get public data</a:t>
             </a:r>
           </a:p>
           <a:p>
-            <a:endParaRPr lang="en-US" dirty="0"/>
+            <a:r>
+              <a:rPr lang="en-US" sz="1800" dirty="0"/>
+              <a:t>Then the authentication process will work</a:t>
+            </a:r>
+          </a:p>
+          <a:p>
+            <a:r>
+              <a:rPr lang="en-US" sz="1800" dirty="0"/>
+              <a:t>Application currently does not fully work due to no content access</a:t>
+            </a:r>
           </a:p>
         </p:txBody>
       </p:sp>

</xml_diff>